<commit_message>
UPDATE: presentation after John's editance
</commit_message>
<xml_diff>
--- a/presentation/AVTest-Swinburne.pptx
+++ b/presentation/AVTest-Swinburne.pptx
@@ -13,16 +13,24 @@
     <p:sldId id="263" r:id="rId7"/>
     <p:sldId id="274" r:id="rId8"/>
     <p:sldId id="259" r:id="rId9"/>
-    <p:sldId id="260" r:id="rId10"/>
-    <p:sldId id="261" r:id="rId11"/>
-    <p:sldId id="262" r:id="rId12"/>
-    <p:sldId id="264" r:id="rId13"/>
-    <p:sldId id="266" r:id="rId14"/>
-    <p:sldId id="267" r:id="rId15"/>
-    <p:sldId id="269" r:id="rId16"/>
-    <p:sldId id="268" r:id="rId17"/>
-    <p:sldId id="275" r:id="rId18"/>
-    <p:sldId id="276" r:id="rId19"/>
+    <p:sldId id="277" r:id="rId10"/>
+    <p:sldId id="278" r:id="rId11"/>
+    <p:sldId id="260" r:id="rId12"/>
+    <p:sldId id="279" r:id="rId13"/>
+    <p:sldId id="282" r:id="rId14"/>
+    <p:sldId id="261" r:id="rId15"/>
+    <p:sldId id="280" r:id="rId16"/>
+    <p:sldId id="283" r:id="rId17"/>
+    <p:sldId id="262" r:id="rId18"/>
+    <p:sldId id="281" r:id="rId19"/>
+    <p:sldId id="284" r:id="rId20"/>
+    <p:sldId id="264" r:id="rId21"/>
+    <p:sldId id="266" r:id="rId22"/>
+    <p:sldId id="267" r:id="rId23"/>
+    <p:sldId id="269" r:id="rId24"/>
+    <p:sldId id="268" r:id="rId25"/>
+    <p:sldId id="275" r:id="rId26"/>
+    <p:sldId id="276" r:id="rId27"/>
   </p:sldIdLst>
   <p:sldSz cx="12192000" cy="6858000"/>
   <p:notesSz cx="6858000" cy="9144000"/>
@@ -121,6 +129,11 @@
       </a:defRPr>
     </a:lvl9pPr>
   </p:defaultTextStyle>
+  <p:extLst>
+    <p:ext uri="{EFAFB233-063F-42B5-8137-9DF3F51BA10A}">
+      <p15:sldGuideLst xmlns:p15="http://schemas.microsoft.com/office/powerpoint/2012/main"/>
+    </p:ext>
+  </p:extLst>
 </p:presentation>
 </file>
 
@@ -8917,7 +8930,7 @@
           <a:p>
             <a:fld id="{D7BCED1E-43FB-7244-8542-F1122AA636CD}" type="datetimeFigureOut">
               <a:rPr lang="en-US" smtClean="0"/>
-              <a:t>7/23/21</a:t>
+              <a:t>7/23/2021</a:t>
             </a:fld>
             <a:endParaRPr lang="en-US"/>
           </a:p>
@@ -9124,7 +9137,7 @@
           <a:p>
             <a:fld id="{D7BCED1E-43FB-7244-8542-F1122AA636CD}" type="datetimeFigureOut">
               <a:rPr lang="en-US" smtClean="0"/>
-              <a:t>7/23/21</a:t>
+              <a:t>7/23/2021</a:t>
             </a:fld>
             <a:endParaRPr lang="en-US"/>
           </a:p>
@@ -9304,7 +9317,7 @@
           <a:p>
             <a:fld id="{D7BCED1E-43FB-7244-8542-F1122AA636CD}" type="datetimeFigureOut">
               <a:rPr lang="en-US" smtClean="0"/>
-              <a:t>7/23/21</a:t>
+              <a:t>7/23/2021</a:t>
             </a:fld>
             <a:endParaRPr lang="en-US"/>
           </a:p>
@@ -9509,7 +9522,7 @@
           <a:p>
             <a:fld id="{D7BCED1E-43FB-7244-8542-F1122AA636CD}" type="datetimeFigureOut">
               <a:rPr lang="en-US" smtClean="0"/>
-              <a:t>7/23/21</a:t>
+              <a:t>7/23/2021</a:t>
             </a:fld>
             <a:endParaRPr lang="en-US"/>
           </a:p>
@@ -18407,7 +18420,7 @@
           <a:p>
             <a:fld id="{D7BCED1E-43FB-7244-8542-F1122AA636CD}" type="datetimeFigureOut">
               <a:rPr lang="en-US" smtClean="0"/>
-              <a:t>7/23/21</a:t>
+              <a:t>7/23/2021</a:t>
             </a:fld>
             <a:endParaRPr lang="en-US"/>
           </a:p>
@@ -18681,7 +18694,7 @@
           <a:p>
             <a:fld id="{D7BCED1E-43FB-7244-8542-F1122AA636CD}" type="datetimeFigureOut">
               <a:rPr lang="en-US" smtClean="0"/>
-              <a:t>7/23/21</a:t>
+              <a:t>7/23/2021</a:t>
             </a:fld>
             <a:endParaRPr lang="en-US"/>
           </a:p>
@@ -19079,7 +19092,7 @@
           <a:p>
             <a:fld id="{D7BCED1E-43FB-7244-8542-F1122AA636CD}" type="datetimeFigureOut">
               <a:rPr lang="en-US" smtClean="0"/>
-              <a:t>7/23/21</a:t>
+              <a:t>7/23/2021</a:t>
             </a:fld>
             <a:endParaRPr lang="en-US"/>
           </a:p>
@@ -19197,7 +19210,7 @@
           <a:p>
             <a:fld id="{D7BCED1E-43FB-7244-8542-F1122AA636CD}" type="datetimeFigureOut">
               <a:rPr lang="en-US" smtClean="0"/>
-              <a:t>7/23/21</a:t>
+              <a:t>7/23/2021</a:t>
             </a:fld>
             <a:endParaRPr lang="en-US"/>
           </a:p>
@@ -19292,7 +19305,7 @@
           <a:p>
             <a:fld id="{D7BCED1E-43FB-7244-8542-F1122AA636CD}" type="datetimeFigureOut">
               <a:rPr lang="en-US" smtClean="0"/>
-              <a:t>7/23/21</a:t>
+              <a:t>7/23/2021</a:t>
             </a:fld>
             <a:endParaRPr lang="en-US"/>
           </a:p>
@@ -19582,7 +19595,7 @@
           <a:p>
             <a:fld id="{D7BCED1E-43FB-7244-8542-F1122AA636CD}" type="datetimeFigureOut">
               <a:rPr lang="en-US" smtClean="0"/>
-              <a:t>7/23/21</a:t>
+              <a:t>7/23/2021</a:t>
             </a:fld>
             <a:endParaRPr lang="en-US"/>
           </a:p>
@@ -19862,7 +19875,7 @@
           <a:p>
             <a:fld id="{D7BCED1E-43FB-7244-8542-F1122AA636CD}" type="datetimeFigureOut">
               <a:rPr lang="en-US" smtClean="0"/>
-              <a:t>7/23/21</a:t>
+              <a:t>7/23/2021</a:t>
             </a:fld>
             <a:endParaRPr lang="en-US"/>
           </a:p>
@@ -20112,7 +20125,7 @@
           <a:p>
             <a:fld id="{D7BCED1E-43FB-7244-8542-F1122AA636CD}" type="datetimeFigureOut">
               <a:rPr lang="en-US" smtClean="0"/>
-              <a:t>7/23/21</a:t>
+              <a:t>7/23/2021</a:t>
             </a:fld>
             <a:endParaRPr lang="en-US"/>
           </a:p>
@@ -20900,7 +20913,7 @@
           <p:cNvPr id="2" name="Title 1">
             <a:extLst>
               <a:ext uri="{FF2B5EF4-FFF2-40B4-BE49-F238E27FC236}">
-                <a16:creationId xmlns:a16="http://schemas.microsoft.com/office/drawing/2014/main" id="{3D84E3CC-85BB-BA40-A195-26509A9C6505}"/>
+                <a16:creationId xmlns:a16="http://schemas.microsoft.com/office/drawing/2014/main" id="{BF0070A0-2291-49C0-ACAB-4386DA1D1EFB}"/>
               </a:ext>
             </a:extLst>
           </p:cNvPr>
@@ -20917,45 +20930,41 @@
           <a:lstStyle/>
           <a:p>
             <a:r>
-              <a:rPr lang="en-US" dirty="0"/>
-              <a:t>36 Scenarios for class C</a:t>
+              <a:rPr lang="en-AU" dirty="0"/>
+              <a:t>Class A – Video</a:t>
             </a:r>
           </a:p>
         </p:txBody>
       </p:sp>
-      <p:pic>
-        <p:nvPicPr>
-          <p:cNvPr id="7" name="Content Placeholder 6" descr="A picture containing text, outdoor, road, highway&#10;&#10;Description automatically generated">
+      <p:sp>
+        <p:nvSpPr>
+          <p:cNvPr id="3" name="Content Placeholder 2">
             <a:extLst>
               <a:ext uri="{FF2B5EF4-FFF2-40B4-BE49-F238E27FC236}">
-                <a16:creationId xmlns:a16="http://schemas.microsoft.com/office/drawing/2014/main" id="{2B2BCFB8-E6E6-AE44-9A25-63ACADD09B69}"/>
+                <a16:creationId xmlns:a16="http://schemas.microsoft.com/office/drawing/2014/main" id="{C45179CE-B5B8-4101-B212-270BBD2B81BC}"/>
               </a:ext>
             </a:extLst>
           </p:cNvPr>
-          <p:cNvPicPr>
-            <a:picLocks noGrp="1" noChangeAspect="1"/>
-          </p:cNvPicPr>
+          <p:cNvSpPr>
+            <a:spLocks noGrp="1"/>
+          </p:cNvSpPr>
           <p:nvPr>
             <p:ph idx="1"/>
           </p:nvPr>
-        </p:nvPicPr>
-        <p:blipFill>
-          <a:blip r:embed="rId2"/>
-          <a:stretch>
-            <a:fillRect/>
-          </a:stretch>
-        </p:blipFill>
-        <p:spPr>
-          <a:xfrm>
-            <a:off x="1023938" y="2799032"/>
-            <a:ext cx="9720262" cy="2996661"/>
-          </a:xfrm>
-        </p:spPr>
-      </p:pic>
+        </p:nvSpPr>
+        <p:spPr/>
+        <p:txBody>
+          <a:bodyPr/>
+          <a:lstStyle/>
+          <a:p>
+            <a:endParaRPr lang="en-AU" dirty="0"/>
+          </a:p>
+        </p:txBody>
+      </p:sp>
     </p:spTree>
     <p:extLst>
       <p:ext uri="{BB962C8B-B14F-4D97-AF65-F5344CB8AC3E}">
-        <p14:creationId xmlns:p14="http://schemas.microsoft.com/office/powerpoint/2010/main" val="1177013817"/>
+        <p14:creationId xmlns:p14="http://schemas.microsoft.com/office/powerpoint/2010/main" val="3916185544"/>
       </p:ext>
     </p:extLst>
   </p:cSld>
@@ -21005,7 +21014,635 @@
           <a:p>
             <a:r>
               <a:rPr lang="en-US" dirty="0"/>
-              <a:t>243 Scenarios for class D</a:t>
+              <a:t>216 Tests for Scenario class B</a:t>
+            </a:r>
+          </a:p>
+        </p:txBody>
+      </p:sp>
+      <p:pic>
+        <p:nvPicPr>
+          <p:cNvPr id="7" name="Content Placeholder 6" descr="A picture containing text, outdoor, way, road&#10;&#10;Description automatically generated">
+            <a:extLst>
+              <a:ext uri="{FF2B5EF4-FFF2-40B4-BE49-F238E27FC236}">
+                <a16:creationId xmlns:a16="http://schemas.microsoft.com/office/drawing/2014/main" id="{E9213985-24ED-0449-BBC5-15C918F68199}"/>
+              </a:ext>
+            </a:extLst>
+          </p:cNvPr>
+          <p:cNvPicPr>
+            <a:picLocks noGrp="1" noChangeAspect="1"/>
+          </p:cNvPicPr>
+          <p:nvPr>
+            <p:ph idx="1"/>
+          </p:nvPr>
+        </p:nvPicPr>
+        <p:blipFill>
+          <a:blip r:embed="rId2"/>
+          <a:stretch>
+            <a:fillRect/>
+          </a:stretch>
+        </p:blipFill>
+        <p:spPr>
+          <a:xfrm>
+            <a:off x="1023938" y="2780968"/>
+            <a:ext cx="9720262" cy="3032789"/>
+          </a:xfrm>
+        </p:spPr>
+      </p:pic>
+    </p:spTree>
+    <p:extLst>
+      <p:ext uri="{BB962C8B-B14F-4D97-AF65-F5344CB8AC3E}">
+        <p14:creationId xmlns:p14="http://schemas.microsoft.com/office/powerpoint/2010/main" val="1299020132"/>
+      </p:ext>
+    </p:extLst>
+  </p:cSld>
+  <p:clrMapOvr>
+    <a:masterClrMapping/>
+  </p:clrMapOvr>
+</p:sld>
+</file>
+
+<file path=ppt/slides/slide12.xml><?xml version="1.0" encoding="utf-8"?>
+<p:sld xmlns:a="http://schemas.openxmlformats.org/drawingml/2006/main" xmlns:r="http://schemas.openxmlformats.org/officeDocument/2006/relationships" xmlns:p="http://schemas.openxmlformats.org/presentationml/2006/main">
+  <p:cSld>
+    <p:spTree>
+      <p:nvGrpSpPr>
+        <p:cNvPr id="1" name=""/>
+        <p:cNvGrpSpPr/>
+        <p:nvPr/>
+      </p:nvGrpSpPr>
+      <p:grpSpPr>
+        <a:xfrm>
+          <a:off x="0" y="0"/>
+          <a:ext cx="0" cy="0"/>
+          <a:chOff x="0" y="0"/>
+          <a:chExt cx="0" cy="0"/>
+        </a:xfrm>
+      </p:grpSpPr>
+      <p:sp>
+        <p:nvSpPr>
+          <p:cNvPr id="2" name="Title 1">
+            <a:extLst>
+              <a:ext uri="{FF2B5EF4-FFF2-40B4-BE49-F238E27FC236}">
+                <a16:creationId xmlns:a16="http://schemas.microsoft.com/office/drawing/2014/main" id="{AA3F2BD8-F9F9-4EE1-85A7-F7F044618D91}"/>
+              </a:ext>
+            </a:extLst>
+          </p:cNvPr>
+          <p:cNvSpPr>
+            <a:spLocks noGrp="1"/>
+          </p:cNvSpPr>
+          <p:nvPr>
+            <p:ph type="title"/>
+          </p:nvPr>
+        </p:nvSpPr>
+        <p:spPr/>
+        <p:txBody>
+          <a:bodyPr/>
+          <a:lstStyle/>
+          <a:p>
+            <a:r>
+              <a:rPr lang="en-AU" dirty="0"/>
+              <a:t>Class B – Pedestrian Intersection</a:t>
+            </a:r>
+          </a:p>
+        </p:txBody>
+      </p:sp>
+      <p:sp>
+        <p:nvSpPr>
+          <p:cNvPr id="3" name="Content Placeholder 2">
+            <a:extLst>
+              <a:ext uri="{FF2B5EF4-FFF2-40B4-BE49-F238E27FC236}">
+                <a16:creationId xmlns:a16="http://schemas.microsoft.com/office/drawing/2014/main" id="{2AE5FC19-490E-402E-9E9D-95D5EAA90014}"/>
+              </a:ext>
+            </a:extLst>
+          </p:cNvPr>
+          <p:cNvSpPr>
+            <a:spLocks noGrp="1"/>
+          </p:cNvSpPr>
+          <p:nvPr>
+            <p:ph idx="1"/>
+          </p:nvPr>
+        </p:nvSpPr>
+        <p:spPr/>
+        <p:txBody>
+          <a:bodyPr>
+            <a:normAutofit/>
+          </a:bodyPr>
+          <a:lstStyle/>
+          <a:p>
+            <a:r>
+              <a:rPr lang="en-AU" dirty="0"/>
+              <a:t>AV makes a right turn at an intersection. Pedestrian encroaches on its right of way where it is trying to turn to.</a:t>
+            </a:r>
+          </a:p>
+          <a:p>
+            <a:r>
+              <a:rPr lang="en-AU" dirty="0"/>
+              <a:t>Scenario parameters:</a:t>
+            </a:r>
+          </a:p>
+          <a:p>
+            <a:pPr lvl="1"/>
+            <a:r>
+              <a:rPr lang="en-AU" dirty="0"/>
+              <a:t>General weather and time of day</a:t>
+            </a:r>
+          </a:p>
+          <a:p>
+            <a:pPr lvl="1"/>
+            <a:r>
+              <a:rPr lang="en-AU" dirty="0"/>
+              <a:t>Pedestrian speed</a:t>
+            </a:r>
+          </a:p>
+          <a:p>
+            <a:pPr lvl="1"/>
+            <a:r>
+              <a:rPr lang="en-AU" dirty="0"/>
+              <a:t>Pedestrian trigger distance</a:t>
+            </a:r>
+          </a:p>
+          <a:p>
+            <a:pPr lvl="1"/>
+            <a:r>
+              <a:rPr lang="en-AU" dirty="0"/>
+              <a:t>Pedestrian spawn distance from curb</a:t>
+            </a:r>
+          </a:p>
+          <a:p>
+            <a:pPr marL="128016" lvl="1" indent="0">
+              <a:buNone/>
+            </a:pPr>
+            <a:endParaRPr lang="en-AU" dirty="0"/>
+          </a:p>
+          <a:p>
+            <a:pPr marL="128016" lvl="1" indent="0">
+              <a:buNone/>
+            </a:pPr>
+            <a:r>
+              <a:rPr lang="en-AU" dirty="0"/>
+              <a:t>Issues found:</a:t>
+            </a:r>
+          </a:p>
+          <a:p>
+            <a:pPr lvl="1"/>
+            <a:r>
+              <a:rPr lang="en-AU" dirty="0"/>
+              <a:t>AV sometimes does not slow down enough before letting the pedestrian pass</a:t>
+            </a:r>
+          </a:p>
+        </p:txBody>
+      </p:sp>
+    </p:spTree>
+    <p:extLst>
+      <p:ext uri="{BB962C8B-B14F-4D97-AF65-F5344CB8AC3E}">
+        <p14:creationId xmlns:p14="http://schemas.microsoft.com/office/powerpoint/2010/main" val="598695567"/>
+      </p:ext>
+    </p:extLst>
+  </p:cSld>
+  <p:clrMapOvr>
+    <a:masterClrMapping/>
+  </p:clrMapOvr>
+</p:sld>
+</file>
+
+<file path=ppt/slides/slide13.xml><?xml version="1.0" encoding="utf-8"?>
+<p:sld xmlns:a="http://schemas.openxmlformats.org/drawingml/2006/main" xmlns:r="http://schemas.openxmlformats.org/officeDocument/2006/relationships" xmlns:p="http://schemas.openxmlformats.org/presentationml/2006/main">
+  <p:cSld>
+    <p:spTree>
+      <p:nvGrpSpPr>
+        <p:cNvPr id="1" name=""/>
+        <p:cNvGrpSpPr/>
+        <p:nvPr/>
+      </p:nvGrpSpPr>
+      <p:grpSpPr>
+        <a:xfrm>
+          <a:off x="0" y="0"/>
+          <a:ext cx="0" cy="0"/>
+          <a:chOff x="0" y="0"/>
+          <a:chExt cx="0" cy="0"/>
+        </a:xfrm>
+      </p:grpSpPr>
+      <p:sp>
+        <p:nvSpPr>
+          <p:cNvPr id="2" name="Title 1">
+            <a:extLst>
+              <a:ext uri="{FF2B5EF4-FFF2-40B4-BE49-F238E27FC236}">
+                <a16:creationId xmlns:a16="http://schemas.microsoft.com/office/drawing/2014/main" id="{BF0070A0-2291-49C0-ACAB-4386DA1D1EFB}"/>
+              </a:ext>
+            </a:extLst>
+          </p:cNvPr>
+          <p:cNvSpPr>
+            <a:spLocks noGrp="1"/>
+          </p:cNvSpPr>
+          <p:nvPr>
+            <p:ph type="title"/>
+          </p:nvPr>
+        </p:nvSpPr>
+        <p:spPr/>
+        <p:txBody>
+          <a:bodyPr/>
+          <a:lstStyle/>
+          <a:p>
+            <a:r>
+              <a:rPr lang="en-AU" dirty="0"/>
+              <a:t>Class B – Video</a:t>
+            </a:r>
+          </a:p>
+        </p:txBody>
+      </p:sp>
+      <p:sp>
+        <p:nvSpPr>
+          <p:cNvPr id="3" name="Content Placeholder 2">
+            <a:extLst>
+              <a:ext uri="{FF2B5EF4-FFF2-40B4-BE49-F238E27FC236}">
+                <a16:creationId xmlns:a16="http://schemas.microsoft.com/office/drawing/2014/main" id="{C45179CE-B5B8-4101-B212-270BBD2B81BC}"/>
+              </a:ext>
+            </a:extLst>
+          </p:cNvPr>
+          <p:cNvSpPr>
+            <a:spLocks noGrp="1"/>
+          </p:cNvSpPr>
+          <p:nvPr>
+            <p:ph idx="1"/>
+          </p:nvPr>
+        </p:nvSpPr>
+        <p:spPr/>
+        <p:txBody>
+          <a:bodyPr/>
+          <a:lstStyle/>
+          <a:p>
+            <a:endParaRPr lang="en-AU" dirty="0"/>
+          </a:p>
+        </p:txBody>
+      </p:sp>
+    </p:spTree>
+    <p:extLst>
+      <p:ext uri="{BB962C8B-B14F-4D97-AF65-F5344CB8AC3E}">
+        <p14:creationId xmlns:p14="http://schemas.microsoft.com/office/powerpoint/2010/main" val="1288862977"/>
+      </p:ext>
+    </p:extLst>
+  </p:cSld>
+  <p:clrMapOvr>
+    <a:masterClrMapping/>
+  </p:clrMapOvr>
+</p:sld>
+</file>
+
+<file path=ppt/slides/slide14.xml><?xml version="1.0" encoding="utf-8"?>
+<p:sld xmlns:a="http://schemas.openxmlformats.org/drawingml/2006/main" xmlns:r="http://schemas.openxmlformats.org/officeDocument/2006/relationships" xmlns:p="http://schemas.openxmlformats.org/presentationml/2006/main">
+  <p:cSld>
+    <p:spTree>
+      <p:nvGrpSpPr>
+        <p:cNvPr id="1" name=""/>
+        <p:cNvGrpSpPr/>
+        <p:nvPr/>
+      </p:nvGrpSpPr>
+      <p:grpSpPr>
+        <a:xfrm>
+          <a:off x="0" y="0"/>
+          <a:ext cx="0" cy="0"/>
+          <a:chOff x="0" y="0"/>
+          <a:chExt cx="0" cy="0"/>
+        </a:xfrm>
+      </p:grpSpPr>
+      <p:sp>
+        <p:nvSpPr>
+          <p:cNvPr id="2" name="Title 1">
+            <a:extLst>
+              <a:ext uri="{FF2B5EF4-FFF2-40B4-BE49-F238E27FC236}">
+                <a16:creationId xmlns:a16="http://schemas.microsoft.com/office/drawing/2014/main" id="{3D84E3CC-85BB-BA40-A195-26509A9C6505}"/>
+              </a:ext>
+            </a:extLst>
+          </p:cNvPr>
+          <p:cNvSpPr>
+            <a:spLocks noGrp="1"/>
+          </p:cNvSpPr>
+          <p:nvPr>
+            <p:ph type="title"/>
+          </p:nvPr>
+        </p:nvSpPr>
+        <p:spPr/>
+        <p:txBody>
+          <a:bodyPr/>
+          <a:lstStyle/>
+          <a:p>
+            <a:r>
+              <a:rPr lang="en-US" dirty="0"/>
+              <a:t>36 Tests for Scenario class C</a:t>
+            </a:r>
+          </a:p>
+        </p:txBody>
+      </p:sp>
+      <p:pic>
+        <p:nvPicPr>
+          <p:cNvPr id="7" name="Content Placeholder 6" descr="A picture containing text, outdoor, road, highway&#10;&#10;Description automatically generated">
+            <a:extLst>
+              <a:ext uri="{FF2B5EF4-FFF2-40B4-BE49-F238E27FC236}">
+                <a16:creationId xmlns:a16="http://schemas.microsoft.com/office/drawing/2014/main" id="{2B2BCFB8-E6E6-AE44-9A25-63ACADD09B69}"/>
+              </a:ext>
+            </a:extLst>
+          </p:cNvPr>
+          <p:cNvPicPr>
+            <a:picLocks noGrp="1" noChangeAspect="1"/>
+          </p:cNvPicPr>
+          <p:nvPr>
+            <p:ph idx="1"/>
+          </p:nvPr>
+        </p:nvPicPr>
+        <p:blipFill>
+          <a:blip r:embed="rId2"/>
+          <a:stretch>
+            <a:fillRect/>
+          </a:stretch>
+        </p:blipFill>
+        <p:spPr>
+          <a:xfrm>
+            <a:off x="1023938" y="2799032"/>
+            <a:ext cx="9720262" cy="2996661"/>
+          </a:xfrm>
+        </p:spPr>
+      </p:pic>
+    </p:spTree>
+    <p:extLst>
+      <p:ext uri="{BB962C8B-B14F-4D97-AF65-F5344CB8AC3E}">
+        <p14:creationId xmlns:p14="http://schemas.microsoft.com/office/powerpoint/2010/main" val="1177013817"/>
+      </p:ext>
+    </p:extLst>
+  </p:cSld>
+  <p:clrMapOvr>
+    <a:masterClrMapping/>
+  </p:clrMapOvr>
+</p:sld>
+</file>
+
+<file path=ppt/slides/slide15.xml><?xml version="1.0" encoding="utf-8"?>
+<p:sld xmlns:a="http://schemas.openxmlformats.org/drawingml/2006/main" xmlns:r="http://schemas.openxmlformats.org/officeDocument/2006/relationships" xmlns:p="http://schemas.openxmlformats.org/presentationml/2006/main">
+  <p:cSld>
+    <p:spTree>
+      <p:nvGrpSpPr>
+        <p:cNvPr id="1" name=""/>
+        <p:cNvGrpSpPr/>
+        <p:nvPr/>
+      </p:nvGrpSpPr>
+      <p:grpSpPr>
+        <a:xfrm>
+          <a:off x="0" y="0"/>
+          <a:ext cx="0" cy="0"/>
+          <a:chOff x="0" y="0"/>
+          <a:chExt cx="0" cy="0"/>
+        </a:xfrm>
+      </p:grpSpPr>
+      <p:sp>
+        <p:nvSpPr>
+          <p:cNvPr id="2" name="Title 1">
+            <a:extLst>
+              <a:ext uri="{FF2B5EF4-FFF2-40B4-BE49-F238E27FC236}">
+                <a16:creationId xmlns:a16="http://schemas.microsoft.com/office/drawing/2014/main" id="{AA3F2BD8-F9F9-4EE1-85A7-F7F044618D91}"/>
+              </a:ext>
+            </a:extLst>
+          </p:cNvPr>
+          <p:cNvSpPr>
+            <a:spLocks noGrp="1"/>
+          </p:cNvSpPr>
+          <p:nvPr>
+            <p:ph type="title"/>
+          </p:nvPr>
+        </p:nvSpPr>
+        <p:spPr/>
+        <p:txBody>
+          <a:bodyPr/>
+          <a:lstStyle/>
+          <a:p>
+            <a:r>
+              <a:rPr lang="en-AU" dirty="0"/>
+              <a:t>Class C – Go around, Oncoming</a:t>
+            </a:r>
+          </a:p>
+        </p:txBody>
+      </p:sp>
+      <p:sp>
+        <p:nvSpPr>
+          <p:cNvPr id="3" name="Content Placeholder 2">
+            <a:extLst>
+              <a:ext uri="{FF2B5EF4-FFF2-40B4-BE49-F238E27FC236}">
+                <a16:creationId xmlns:a16="http://schemas.microsoft.com/office/drawing/2014/main" id="{2AE5FC19-490E-402E-9E9D-95D5EAA90014}"/>
+              </a:ext>
+            </a:extLst>
+          </p:cNvPr>
+          <p:cNvSpPr>
+            <a:spLocks noGrp="1"/>
+          </p:cNvSpPr>
+          <p:nvPr>
+            <p:ph idx="1"/>
+          </p:nvPr>
+        </p:nvSpPr>
+        <p:spPr/>
+        <p:txBody>
+          <a:bodyPr>
+            <a:normAutofit/>
+          </a:bodyPr>
+          <a:lstStyle/>
+          <a:p>
+            <a:r>
+              <a:rPr lang="en-AU" dirty="0"/>
+              <a:t>AV attempts to encroach onto the other side of the road to get around a stationary NPC in its way. However, another NPC is oncoming and approaching it.</a:t>
+            </a:r>
+          </a:p>
+          <a:p>
+            <a:r>
+              <a:rPr lang="en-AU" dirty="0"/>
+              <a:t>Scenario parameters:</a:t>
+            </a:r>
+          </a:p>
+          <a:p>
+            <a:pPr lvl="1"/>
+            <a:r>
+              <a:rPr lang="en-AU" dirty="0"/>
+              <a:t>General weather and time of day</a:t>
+            </a:r>
+          </a:p>
+          <a:p>
+            <a:pPr lvl="1"/>
+            <a:r>
+              <a:rPr lang="en-AU" dirty="0"/>
+              <a:t>Oncoming NPC speed</a:t>
+            </a:r>
+          </a:p>
+          <a:p>
+            <a:pPr lvl="1"/>
+            <a:r>
+              <a:rPr lang="en-AU" dirty="0"/>
+              <a:t>Oncoming NPC trigger distance</a:t>
+            </a:r>
+          </a:p>
+          <a:p>
+            <a:pPr lvl="1"/>
+            <a:r>
+              <a:rPr lang="en-AU" dirty="0"/>
+              <a:t>Oncoming NPC spawn distance</a:t>
+            </a:r>
+          </a:p>
+          <a:p>
+            <a:pPr marL="128016" lvl="1" indent="0">
+              <a:buNone/>
+            </a:pPr>
+            <a:endParaRPr lang="en-AU" dirty="0"/>
+          </a:p>
+          <a:p>
+            <a:pPr marL="128016" lvl="1" indent="0">
+              <a:buNone/>
+            </a:pPr>
+            <a:r>
+              <a:rPr lang="en-AU" dirty="0"/>
+              <a:t>Issues found:</a:t>
+            </a:r>
+          </a:p>
+          <a:p>
+            <a:pPr lvl="1"/>
+            <a:r>
+              <a:rPr lang="en-AU" dirty="0"/>
+              <a:t>None; Ego vehicle does not ever encroach to the other side of the road, regardless of the presence of an oncoming vehicle</a:t>
+            </a:r>
+          </a:p>
+        </p:txBody>
+      </p:sp>
+    </p:spTree>
+    <p:extLst>
+      <p:ext uri="{BB962C8B-B14F-4D97-AF65-F5344CB8AC3E}">
+        <p14:creationId xmlns:p14="http://schemas.microsoft.com/office/powerpoint/2010/main" val="2666297205"/>
+      </p:ext>
+    </p:extLst>
+  </p:cSld>
+  <p:clrMapOvr>
+    <a:masterClrMapping/>
+  </p:clrMapOvr>
+</p:sld>
+</file>
+
+<file path=ppt/slides/slide16.xml><?xml version="1.0" encoding="utf-8"?>
+<p:sld xmlns:a="http://schemas.openxmlformats.org/drawingml/2006/main" xmlns:r="http://schemas.openxmlformats.org/officeDocument/2006/relationships" xmlns:p="http://schemas.openxmlformats.org/presentationml/2006/main">
+  <p:cSld>
+    <p:spTree>
+      <p:nvGrpSpPr>
+        <p:cNvPr id="1" name=""/>
+        <p:cNvGrpSpPr/>
+        <p:nvPr/>
+      </p:nvGrpSpPr>
+      <p:grpSpPr>
+        <a:xfrm>
+          <a:off x="0" y="0"/>
+          <a:ext cx="0" cy="0"/>
+          <a:chOff x="0" y="0"/>
+          <a:chExt cx="0" cy="0"/>
+        </a:xfrm>
+      </p:grpSpPr>
+      <p:sp>
+        <p:nvSpPr>
+          <p:cNvPr id="2" name="Title 1">
+            <a:extLst>
+              <a:ext uri="{FF2B5EF4-FFF2-40B4-BE49-F238E27FC236}">
+                <a16:creationId xmlns:a16="http://schemas.microsoft.com/office/drawing/2014/main" id="{BF0070A0-2291-49C0-ACAB-4386DA1D1EFB}"/>
+              </a:ext>
+            </a:extLst>
+          </p:cNvPr>
+          <p:cNvSpPr>
+            <a:spLocks noGrp="1"/>
+          </p:cNvSpPr>
+          <p:nvPr>
+            <p:ph type="title"/>
+          </p:nvPr>
+        </p:nvSpPr>
+        <p:spPr/>
+        <p:txBody>
+          <a:bodyPr/>
+          <a:lstStyle/>
+          <a:p>
+            <a:r>
+              <a:rPr lang="en-AU" dirty="0"/>
+              <a:t>Class C – Video</a:t>
+            </a:r>
+          </a:p>
+        </p:txBody>
+      </p:sp>
+      <p:sp>
+        <p:nvSpPr>
+          <p:cNvPr id="3" name="Content Placeholder 2">
+            <a:extLst>
+              <a:ext uri="{FF2B5EF4-FFF2-40B4-BE49-F238E27FC236}">
+                <a16:creationId xmlns:a16="http://schemas.microsoft.com/office/drawing/2014/main" id="{C45179CE-B5B8-4101-B212-270BBD2B81BC}"/>
+              </a:ext>
+            </a:extLst>
+          </p:cNvPr>
+          <p:cNvSpPr>
+            <a:spLocks noGrp="1"/>
+          </p:cNvSpPr>
+          <p:nvPr>
+            <p:ph idx="1"/>
+          </p:nvPr>
+        </p:nvSpPr>
+        <p:spPr/>
+        <p:txBody>
+          <a:bodyPr/>
+          <a:lstStyle/>
+          <a:p>
+            <a:endParaRPr lang="en-AU" dirty="0"/>
+          </a:p>
+        </p:txBody>
+      </p:sp>
+    </p:spTree>
+    <p:extLst>
+      <p:ext uri="{BB962C8B-B14F-4D97-AF65-F5344CB8AC3E}">
+        <p14:creationId xmlns:p14="http://schemas.microsoft.com/office/powerpoint/2010/main" val="2878681111"/>
+      </p:ext>
+    </p:extLst>
+  </p:cSld>
+  <p:clrMapOvr>
+    <a:masterClrMapping/>
+  </p:clrMapOvr>
+</p:sld>
+</file>
+
+<file path=ppt/slides/slide17.xml><?xml version="1.0" encoding="utf-8"?>
+<p:sld xmlns:a="http://schemas.openxmlformats.org/drawingml/2006/main" xmlns:r="http://schemas.openxmlformats.org/officeDocument/2006/relationships" xmlns:p="http://schemas.openxmlformats.org/presentationml/2006/main">
+  <p:cSld>
+    <p:spTree>
+      <p:nvGrpSpPr>
+        <p:cNvPr id="1" name=""/>
+        <p:cNvGrpSpPr/>
+        <p:nvPr/>
+      </p:nvGrpSpPr>
+      <p:grpSpPr>
+        <a:xfrm>
+          <a:off x="0" y="0"/>
+          <a:ext cx="0" cy="0"/>
+          <a:chOff x="0" y="0"/>
+          <a:chExt cx="0" cy="0"/>
+        </a:xfrm>
+      </p:grpSpPr>
+      <p:sp>
+        <p:nvSpPr>
+          <p:cNvPr id="2" name="Title 1">
+            <a:extLst>
+              <a:ext uri="{FF2B5EF4-FFF2-40B4-BE49-F238E27FC236}">
+                <a16:creationId xmlns:a16="http://schemas.microsoft.com/office/drawing/2014/main" id="{3D84E3CC-85BB-BA40-A195-26509A9C6505}"/>
+              </a:ext>
+            </a:extLst>
+          </p:cNvPr>
+          <p:cNvSpPr>
+            <a:spLocks noGrp="1"/>
+          </p:cNvSpPr>
+          <p:nvPr>
+            <p:ph type="title"/>
+          </p:nvPr>
+        </p:nvSpPr>
+        <p:spPr/>
+        <p:txBody>
+          <a:bodyPr/>
+          <a:lstStyle/>
+          <a:p>
+            <a:r>
+              <a:rPr lang="en-US" dirty="0"/>
+              <a:t>243 Tests for Scenario class D</a:t>
             </a:r>
           </a:p>
         </p:txBody>
@@ -21052,7 +21689,372 @@
 </p:sld>
 </file>
 
-<file path=ppt/slides/slide12.xml><?xml version="1.0" encoding="utf-8"?>
+<file path=ppt/slides/slide18.xml><?xml version="1.0" encoding="utf-8"?>
+<p:sld xmlns:a="http://schemas.openxmlformats.org/drawingml/2006/main" xmlns:r="http://schemas.openxmlformats.org/officeDocument/2006/relationships" xmlns:p="http://schemas.openxmlformats.org/presentationml/2006/main">
+  <p:cSld>
+    <p:spTree>
+      <p:nvGrpSpPr>
+        <p:cNvPr id="1" name=""/>
+        <p:cNvGrpSpPr/>
+        <p:nvPr/>
+      </p:nvGrpSpPr>
+      <p:grpSpPr>
+        <a:xfrm>
+          <a:off x="0" y="0"/>
+          <a:ext cx="0" cy="0"/>
+          <a:chOff x="0" y="0"/>
+          <a:chExt cx="0" cy="0"/>
+        </a:xfrm>
+      </p:grpSpPr>
+      <p:sp>
+        <p:nvSpPr>
+          <p:cNvPr id="2" name="Title 1">
+            <a:extLst>
+              <a:ext uri="{FF2B5EF4-FFF2-40B4-BE49-F238E27FC236}">
+                <a16:creationId xmlns:a16="http://schemas.microsoft.com/office/drawing/2014/main" id="{AA3F2BD8-F9F9-4EE1-85A7-F7F044618D91}"/>
+              </a:ext>
+            </a:extLst>
+          </p:cNvPr>
+          <p:cNvSpPr>
+            <a:spLocks noGrp="1"/>
+          </p:cNvSpPr>
+          <p:nvPr>
+            <p:ph type="title"/>
+          </p:nvPr>
+        </p:nvSpPr>
+        <p:spPr/>
+        <p:txBody>
+          <a:bodyPr/>
+          <a:lstStyle/>
+          <a:p>
+            <a:r>
+              <a:rPr lang="en-AU" dirty="0"/>
+              <a:t>Class D – Camera Tricks</a:t>
+            </a:r>
+          </a:p>
+        </p:txBody>
+      </p:sp>
+      <p:sp>
+        <p:nvSpPr>
+          <p:cNvPr id="3" name="Content Placeholder 2">
+            <a:extLst>
+              <a:ext uri="{FF2B5EF4-FFF2-40B4-BE49-F238E27FC236}">
+                <a16:creationId xmlns:a16="http://schemas.microsoft.com/office/drawing/2014/main" id="{2AE5FC19-490E-402E-9E9D-95D5EAA90014}"/>
+              </a:ext>
+            </a:extLst>
+          </p:cNvPr>
+          <p:cNvSpPr>
+            <a:spLocks noGrp="1"/>
+          </p:cNvSpPr>
+          <p:nvPr>
+            <p:ph idx="1"/>
+          </p:nvPr>
+        </p:nvSpPr>
+        <p:spPr>
+          <a:xfrm>
+            <a:off x="1024128" y="2286000"/>
+            <a:ext cx="9720073" cy="4161934"/>
+          </a:xfrm>
+        </p:spPr>
+        <p:txBody>
+          <a:bodyPr>
+            <a:normAutofit fontScale="85000" lnSpcReduction="10000"/>
+          </a:bodyPr>
+          <a:lstStyle/>
+          <a:p>
+            <a:r>
+              <a:rPr lang="en-AU" dirty="0"/>
+              <a:t>AV navigates a crowded 4-way intersection with right of way, however, two perpendicular NPC cars enter the intersection as well, encroaching into its path.</a:t>
+            </a:r>
+          </a:p>
+          <a:p>
+            <a:r>
+              <a:rPr lang="en-AU" dirty="0"/>
+              <a:t>Scenario parameters:</a:t>
+            </a:r>
+          </a:p>
+          <a:p>
+            <a:pPr lvl="1"/>
+            <a:r>
+              <a:rPr lang="en-AU" dirty="0"/>
+              <a:t>General weather and time of day</a:t>
+            </a:r>
+          </a:p>
+          <a:p>
+            <a:pPr lvl="1"/>
+            <a:r>
+              <a:rPr lang="en-AU" dirty="0"/>
+              <a:t>Left-side NPC speed</a:t>
+            </a:r>
+          </a:p>
+          <a:p>
+            <a:pPr lvl="1"/>
+            <a:r>
+              <a:rPr lang="en-AU" dirty="0"/>
+              <a:t>Left-side NPC trigger distance</a:t>
+            </a:r>
+          </a:p>
+          <a:p>
+            <a:pPr lvl="1"/>
+            <a:r>
+              <a:rPr lang="en-AU" dirty="0"/>
+              <a:t>Right-side NPC speed</a:t>
+            </a:r>
+          </a:p>
+          <a:p>
+            <a:pPr lvl="1"/>
+            <a:r>
+              <a:rPr lang="en-AU" dirty="0"/>
+              <a:t>Right-side NPC trigger distance</a:t>
+            </a:r>
+          </a:p>
+          <a:p>
+            <a:pPr lvl="1"/>
+            <a:r>
+              <a:rPr lang="en-AU" dirty="0"/>
+              <a:t>Ego vehicle turn direction (straight ahead, left turn, right turn)</a:t>
+            </a:r>
+          </a:p>
+          <a:p>
+            <a:pPr lvl="1"/>
+            <a:r>
+              <a:rPr lang="en-AU" dirty="0"/>
+              <a:t>RGB values for NPC vehicles (used for testing the camera module, if enabled in future)</a:t>
+            </a:r>
+          </a:p>
+          <a:p>
+            <a:pPr lvl="1"/>
+            <a:endParaRPr lang="en-AU" dirty="0"/>
+          </a:p>
+          <a:p>
+            <a:pPr marL="128016" lvl="1" indent="0">
+              <a:buNone/>
+            </a:pPr>
+            <a:r>
+              <a:rPr lang="en-AU" dirty="0"/>
+              <a:t>Issues found:</a:t>
+            </a:r>
+          </a:p>
+          <a:p>
+            <a:pPr lvl="1"/>
+            <a:r>
+              <a:rPr lang="en-AU" dirty="0"/>
+              <a:t>AV fails to stop or even slow down in time, especially when driving straight ahead, sometimes colliding side on to an NPC</a:t>
+            </a:r>
+          </a:p>
+          <a:p>
+            <a:pPr lvl="1"/>
+            <a:r>
+              <a:rPr lang="en-AU" dirty="0"/>
+              <a:t>AV sometimes collides during turns as well</a:t>
+            </a:r>
+          </a:p>
+          <a:p>
+            <a:pPr lvl="1"/>
+            <a:r>
+              <a:rPr lang="en-AU" dirty="0"/>
+              <a:t>Large inconsistencies in AV behaviour for same scenario parameters</a:t>
+            </a:r>
+          </a:p>
+        </p:txBody>
+      </p:sp>
+    </p:spTree>
+    <p:extLst>
+      <p:ext uri="{BB962C8B-B14F-4D97-AF65-F5344CB8AC3E}">
+        <p14:creationId xmlns:p14="http://schemas.microsoft.com/office/powerpoint/2010/main" val="1990508049"/>
+      </p:ext>
+    </p:extLst>
+  </p:cSld>
+  <p:clrMapOvr>
+    <a:masterClrMapping/>
+  </p:clrMapOvr>
+</p:sld>
+</file>
+
+<file path=ppt/slides/slide19.xml><?xml version="1.0" encoding="utf-8"?>
+<p:sld xmlns:a="http://schemas.openxmlformats.org/drawingml/2006/main" xmlns:r="http://schemas.openxmlformats.org/officeDocument/2006/relationships" xmlns:p="http://schemas.openxmlformats.org/presentationml/2006/main">
+  <p:cSld>
+    <p:spTree>
+      <p:nvGrpSpPr>
+        <p:cNvPr id="1" name=""/>
+        <p:cNvGrpSpPr/>
+        <p:nvPr/>
+      </p:nvGrpSpPr>
+      <p:grpSpPr>
+        <a:xfrm>
+          <a:off x="0" y="0"/>
+          <a:ext cx="0" cy="0"/>
+          <a:chOff x="0" y="0"/>
+          <a:chExt cx="0" cy="0"/>
+        </a:xfrm>
+      </p:grpSpPr>
+      <p:sp>
+        <p:nvSpPr>
+          <p:cNvPr id="2" name="Title 1">
+            <a:extLst>
+              <a:ext uri="{FF2B5EF4-FFF2-40B4-BE49-F238E27FC236}">
+                <a16:creationId xmlns:a16="http://schemas.microsoft.com/office/drawing/2014/main" id="{BF0070A0-2291-49C0-ACAB-4386DA1D1EFB}"/>
+              </a:ext>
+            </a:extLst>
+          </p:cNvPr>
+          <p:cNvSpPr>
+            <a:spLocks noGrp="1"/>
+          </p:cNvSpPr>
+          <p:nvPr>
+            <p:ph type="title"/>
+          </p:nvPr>
+        </p:nvSpPr>
+        <p:spPr/>
+        <p:txBody>
+          <a:bodyPr/>
+          <a:lstStyle/>
+          <a:p>
+            <a:r>
+              <a:rPr lang="en-AU" dirty="0"/>
+              <a:t>Class D – Video</a:t>
+            </a:r>
+          </a:p>
+        </p:txBody>
+      </p:sp>
+      <p:sp>
+        <p:nvSpPr>
+          <p:cNvPr id="3" name="Content Placeholder 2">
+            <a:extLst>
+              <a:ext uri="{FF2B5EF4-FFF2-40B4-BE49-F238E27FC236}">
+                <a16:creationId xmlns:a16="http://schemas.microsoft.com/office/drawing/2014/main" id="{C45179CE-B5B8-4101-B212-270BBD2B81BC}"/>
+              </a:ext>
+            </a:extLst>
+          </p:cNvPr>
+          <p:cNvSpPr>
+            <a:spLocks noGrp="1"/>
+          </p:cNvSpPr>
+          <p:nvPr>
+            <p:ph idx="1"/>
+          </p:nvPr>
+        </p:nvSpPr>
+        <p:spPr/>
+        <p:txBody>
+          <a:bodyPr/>
+          <a:lstStyle/>
+          <a:p>
+            <a:endParaRPr lang="en-AU" dirty="0"/>
+          </a:p>
+        </p:txBody>
+      </p:sp>
+    </p:spTree>
+    <p:extLst>
+      <p:ext uri="{BB962C8B-B14F-4D97-AF65-F5344CB8AC3E}">
+        <p14:creationId xmlns:p14="http://schemas.microsoft.com/office/powerpoint/2010/main" val="242287244"/>
+      </p:ext>
+    </p:extLst>
+  </p:cSld>
+  <p:clrMapOvr>
+    <a:masterClrMapping/>
+  </p:clrMapOvr>
+</p:sld>
+</file>
+
+<file path=ppt/slides/slide2.xml><?xml version="1.0" encoding="utf-8"?>
+<p:sld xmlns:a="http://schemas.openxmlformats.org/drawingml/2006/main" xmlns:r="http://schemas.openxmlformats.org/officeDocument/2006/relationships" xmlns:p="http://schemas.openxmlformats.org/presentationml/2006/main">
+  <p:cSld>
+    <p:spTree>
+      <p:nvGrpSpPr>
+        <p:cNvPr id="1" name=""/>
+        <p:cNvGrpSpPr/>
+        <p:nvPr/>
+      </p:nvGrpSpPr>
+      <p:grpSpPr>
+        <a:xfrm>
+          <a:off x="0" y="0"/>
+          <a:ext cx="0" cy="0"/>
+          <a:chOff x="0" y="0"/>
+          <a:chExt cx="0" cy="0"/>
+        </a:xfrm>
+      </p:grpSpPr>
+      <p:sp>
+        <p:nvSpPr>
+          <p:cNvPr id="2" name="Title 1">
+            <a:extLst>
+              <a:ext uri="{FF2B5EF4-FFF2-40B4-BE49-F238E27FC236}">
+                <a16:creationId xmlns:a16="http://schemas.microsoft.com/office/drawing/2014/main" id="{3D84E3CC-85BB-BA40-A195-26509A9C6505}"/>
+              </a:ext>
+            </a:extLst>
+          </p:cNvPr>
+          <p:cNvSpPr>
+            <a:spLocks noGrp="1"/>
+          </p:cNvSpPr>
+          <p:nvPr>
+            <p:ph type="title"/>
+          </p:nvPr>
+        </p:nvSpPr>
+        <p:spPr/>
+        <p:txBody>
+          <a:bodyPr/>
+          <a:lstStyle/>
+          <a:p>
+            <a:r>
+              <a:rPr lang="en-US" dirty="0"/>
+              <a:t>Introduction</a:t>
+            </a:r>
+          </a:p>
+        </p:txBody>
+      </p:sp>
+      <p:sp>
+        <p:nvSpPr>
+          <p:cNvPr id="7" name="Content Placeholder 6">
+            <a:extLst>
+              <a:ext uri="{FF2B5EF4-FFF2-40B4-BE49-F238E27FC236}">
+                <a16:creationId xmlns:a16="http://schemas.microsoft.com/office/drawing/2014/main" id="{BB95697F-2E93-2B41-909F-9C20EAFBE725}"/>
+              </a:ext>
+            </a:extLst>
+          </p:cNvPr>
+          <p:cNvSpPr>
+            <a:spLocks noGrp="1"/>
+          </p:cNvSpPr>
+          <p:nvPr>
+            <p:ph idx="1"/>
+          </p:nvPr>
+        </p:nvSpPr>
+        <p:spPr/>
+        <p:txBody>
+          <a:bodyPr/>
+          <a:lstStyle/>
+          <a:p>
+            <a:r>
+              <a:rPr lang="en-US" dirty="0"/>
+              <a:t>Our work presents new empirical evidence that it is feasible to </a:t>
+            </a:r>
+          </a:p>
+          <a:p>
+            <a:pPr lvl="1"/>
+            <a:r>
+              <a:rPr lang="en-US" dirty="0"/>
+              <a:t>Derive a good scenario diversity, and at the same time </a:t>
+            </a:r>
+          </a:p>
+          <a:p>
+            <a:pPr lvl="1"/>
+            <a:r>
+              <a:rPr lang="en-US" dirty="0"/>
+              <a:t>Detect AV problems in the simulation environment. </a:t>
+            </a:r>
+          </a:p>
+        </p:txBody>
+      </p:sp>
+    </p:spTree>
+    <p:extLst>
+      <p:ext uri="{BB962C8B-B14F-4D97-AF65-F5344CB8AC3E}">
+        <p14:creationId xmlns:p14="http://schemas.microsoft.com/office/powerpoint/2010/main" val="2320901608"/>
+      </p:ext>
+    </p:extLst>
+  </p:cSld>
+  <p:clrMapOvr>
+    <a:masterClrMapping/>
+  </p:clrMapOvr>
+</p:sld>
+</file>
+
+<file path=ppt/slides/slide20.xml><?xml version="1.0" encoding="utf-8"?>
 <p:sld xmlns:a="http://schemas.openxmlformats.org/drawingml/2006/main" xmlns:r="http://schemas.openxmlformats.org/officeDocument/2006/relationships" xmlns:p="http://schemas.openxmlformats.org/presentationml/2006/main">
   <p:cSld>
     <p:spTree>
@@ -21151,7 +22153,7 @@
 </p:sld>
 </file>
 
-<file path=ppt/slides/slide13.xml><?xml version="1.0" encoding="utf-8"?>
+<file path=ppt/slides/slide21.xml><?xml version="1.0" encoding="utf-8"?>
 <p:sld xmlns:a="http://schemas.openxmlformats.org/drawingml/2006/main" xmlns:r="http://schemas.openxmlformats.org/officeDocument/2006/relationships" xmlns:p="http://schemas.openxmlformats.org/presentationml/2006/main">
   <p:cSld>
     <p:spTree>
@@ -21310,7 +22312,7 @@
 </p:sld>
 </file>
 
-<file path=ppt/slides/slide14.xml><?xml version="1.0" encoding="utf-8"?>
+<file path=ppt/slides/slide22.xml><?xml version="1.0" encoding="utf-8"?>
 <p:sld xmlns:a="http://schemas.openxmlformats.org/drawingml/2006/main" xmlns:r="http://schemas.openxmlformats.org/officeDocument/2006/relationships" xmlns:p="http://schemas.openxmlformats.org/presentationml/2006/main">
   <p:cSld>
     <p:spTree>
@@ -21420,7 +22422,7 @@
 </p:sld>
 </file>
 
-<file path=ppt/slides/slide15.xml><?xml version="1.0" encoding="utf-8"?>
+<file path=ppt/slides/slide23.xml><?xml version="1.0" encoding="utf-8"?>
 <p:sld xmlns:a="http://schemas.openxmlformats.org/drawingml/2006/main" xmlns:r="http://schemas.openxmlformats.org/officeDocument/2006/relationships" xmlns:p="http://schemas.openxmlformats.org/presentationml/2006/main">
   <p:cSld>
     <p:spTree>
@@ -21519,7 +22521,7 @@
 </p:sld>
 </file>
 
-<file path=ppt/slides/slide16.xml><?xml version="1.0" encoding="utf-8"?>
+<file path=ppt/slides/slide24.xml><?xml version="1.0" encoding="utf-8"?>
 <p:sld xmlns:a="http://schemas.openxmlformats.org/drawingml/2006/main" xmlns:r="http://schemas.openxmlformats.org/officeDocument/2006/relationships" xmlns:p="http://schemas.openxmlformats.org/presentationml/2006/main">
   <p:cSld>
     <p:spTree>
@@ -21629,7 +22631,7 @@
 </p:sld>
 </file>
 
-<file path=ppt/slides/slide17.xml><?xml version="1.0" encoding="utf-8"?>
+<file path=ppt/slides/slide25.xml><?xml version="1.0" encoding="utf-8"?>
 <p:sld xmlns:a="http://schemas.openxmlformats.org/drawingml/2006/main" xmlns:r="http://schemas.openxmlformats.org/officeDocument/2006/relationships" xmlns:p="http://schemas.openxmlformats.org/presentationml/2006/main">
   <p:cSld>
     <p:spTree>
@@ -21709,15 +22711,7 @@
           <a:p>
             <a:r>
               <a:rPr lang="en-US" dirty="0"/>
-              <a:t>Answer to RQ3: The environmental conditions do have an impact on the safety of </a:t>
-            </a:r>
-            <a:r>
-              <a:rPr lang="en-US" dirty="0" err="1"/>
-              <a:t>Avs</a:t>
-            </a:r>
-            <a:r>
-              <a:rPr lang="en-US" dirty="0"/>
-              <a:t>.</a:t>
+              <a:t>Answer to RQ3: The environmental conditions do have an impact on the safety of AVs.</a:t>
             </a:r>
           </a:p>
           <a:p>
@@ -21741,7 +22735,7 @@
 </p:sld>
 </file>
 
-<file path=ppt/slides/slide18.xml><?xml version="1.0" encoding="utf-8"?>
+<file path=ppt/slides/slide26.xml><?xml version="1.0" encoding="utf-8"?>
 <p:sld xmlns:a="http://schemas.openxmlformats.org/drawingml/2006/main" xmlns:r="http://schemas.openxmlformats.org/officeDocument/2006/relationships" xmlns:p="http://schemas.openxmlformats.org/presentationml/2006/main">
   <p:cSld>
     <p:spTree>
@@ -21824,106 +22818,6 @@
     <p:extLst>
       <p:ext uri="{BB962C8B-B14F-4D97-AF65-F5344CB8AC3E}">
         <p14:creationId xmlns:p14="http://schemas.microsoft.com/office/powerpoint/2010/main" val="1465576913"/>
-      </p:ext>
-    </p:extLst>
-  </p:cSld>
-  <p:clrMapOvr>
-    <a:masterClrMapping/>
-  </p:clrMapOvr>
-</p:sld>
-</file>
-
-<file path=ppt/slides/slide2.xml><?xml version="1.0" encoding="utf-8"?>
-<p:sld xmlns:a="http://schemas.openxmlformats.org/drawingml/2006/main" xmlns:r="http://schemas.openxmlformats.org/officeDocument/2006/relationships" xmlns:p="http://schemas.openxmlformats.org/presentationml/2006/main">
-  <p:cSld>
-    <p:spTree>
-      <p:nvGrpSpPr>
-        <p:cNvPr id="1" name=""/>
-        <p:cNvGrpSpPr/>
-        <p:nvPr/>
-      </p:nvGrpSpPr>
-      <p:grpSpPr>
-        <a:xfrm>
-          <a:off x="0" y="0"/>
-          <a:ext cx="0" cy="0"/>
-          <a:chOff x="0" y="0"/>
-          <a:chExt cx="0" cy="0"/>
-        </a:xfrm>
-      </p:grpSpPr>
-      <p:sp>
-        <p:nvSpPr>
-          <p:cNvPr id="2" name="Title 1">
-            <a:extLst>
-              <a:ext uri="{FF2B5EF4-FFF2-40B4-BE49-F238E27FC236}">
-                <a16:creationId xmlns:a16="http://schemas.microsoft.com/office/drawing/2014/main" id="{3D84E3CC-85BB-BA40-A195-26509A9C6505}"/>
-              </a:ext>
-            </a:extLst>
-          </p:cNvPr>
-          <p:cNvSpPr>
-            <a:spLocks noGrp="1"/>
-          </p:cNvSpPr>
-          <p:nvPr>
-            <p:ph type="title"/>
-          </p:nvPr>
-        </p:nvSpPr>
-        <p:spPr/>
-        <p:txBody>
-          <a:bodyPr/>
-          <a:lstStyle/>
-          <a:p>
-            <a:r>
-              <a:rPr lang="en-US" dirty="0"/>
-              <a:t>Introduction</a:t>
-            </a:r>
-          </a:p>
-        </p:txBody>
-      </p:sp>
-      <p:sp>
-        <p:nvSpPr>
-          <p:cNvPr id="7" name="Content Placeholder 6">
-            <a:extLst>
-              <a:ext uri="{FF2B5EF4-FFF2-40B4-BE49-F238E27FC236}">
-                <a16:creationId xmlns:a16="http://schemas.microsoft.com/office/drawing/2014/main" id="{BB95697F-2E93-2B41-909F-9C20EAFBE725}"/>
-              </a:ext>
-            </a:extLst>
-          </p:cNvPr>
-          <p:cNvSpPr>
-            <a:spLocks noGrp="1"/>
-          </p:cNvSpPr>
-          <p:nvPr>
-            <p:ph idx="1"/>
-          </p:nvPr>
-        </p:nvSpPr>
-        <p:spPr/>
-        <p:txBody>
-          <a:bodyPr/>
-          <a:lstStyle/>
-          <a:p>
-            <a:r>
-              <a:rPr lang="en-US" dirty="0"/>
-              <a:t>Our work presents new empirical evidence that it is feasible to </a:t>
-            </a:r>
-          </a:p>
-          <a:p>
-            <a:pPr lvl="1"/>
-            <a:r>
-              <a:rPr lang="en-US" dirty="0"/>
-              <a:t>derive a good scenario diversity, and at the same time </a:t>
-            </a:r>
-          </a:p>
-          <a:p>
-            <a:pPr lvl="1"/>
-            <a:r>
-              <a:rPr lang="en-US" dirty="0"/>
-              <a:t>detect AV problems in the simulation environment. </a:t>
-            </a:r>
-          </a:p>
-        </p:txBody>
-      </p:sp>
-    </p:spTree>
-    <p:extLst>
-      <p:ext uri="{BB962C8B-B14F-4D97-AF65-F5344CB8AC3E}">
-        <p14:creationId xmlns:p14="http://schemas.microsoft.com/office/powerpoint/2010/main" val="2320901608"/>
       </p:ext>
     </p:extLst>
   </p:cSld>
@@ -22019,7 +22913,7 @@
           <a:p>
             <a:r>
               <a:rPr lang="en-US" dirty="0"/>
-              <a:t>RQ4: Is the use of simulator-based systems helpful in understanding safety in reality</a:t>
+              <a:t>RQ4: Is the use of simulator-based systems helpful in understanding safety in reality?</a:t>
             </a:r>
           </a:p>
         </p:txBody>
@@ -22105,7 +22999,7 @@
           <a:p>
             <a:r>
               <a:rPr lang="en-US" dirty="0"/>
-              <a:t>Equivalent Partitioning</a:t>
+              <a:t>Equivalence Partitioning</a:t>
             </a:r>
           </a:p>
           <a:p>
@@ -22466,7 +23360,7 @@
           <a:p>
             <a:r>
               <a:rPr lang="en-US" dirty="0"/>
-              <a:t>81 Scenarios for class A</a:t>
+              <a:t>81 Tests for Scenario class A</a:t>
             </a:r>
           </a:p>
         </p:txBody>
@@ -22535,7 +23429,7 @@
           <p:cNvPr id="2" name="Title 1">
             <a:extLst>
               <a:ext uri="{FF2B5EF4-FFF2-40B4-BE49-F238E27FC236}">
-                <a16:creationId xmlns:a16="http://schemas.microsoft.com/office/drawing/2014/main" id="{3D84E3CC-85BB-BA40-A195-26509A9C6505}"/>
+                <a16:creationId xmlns:a16="http://schemas.microsoft.com/office/drawing/2014/main" id="{AA3F2BD8-F9F9-4EE1-85A7-F7F044618D91}"/>
               </a:ext>
             </a:extLst>
           </p:cNvPr>
@@ -22552,45 +23446,112 @@
           <a:lstStyle/>
           <a:p>
             <a:r>
-              <a:rPr lang="en-US" dirty="0"/>
-              <a:t>216 Scenarios for class B</a:t>
+              <a:rPr lang="en-AU" dirty="0"/>
+              <a:t>Class A – Close Quarters</a:t>
             </a:r>
           </a:p>
         </p:txBody>
       </p:sp>
-      <p:pic>
-        <p:nvPicPr>
-          <p:cNvPr id="7" name="Content Placeholder 6" descr="A picture containing text, outdoor, way, road&#10;&#10;Description automatically generated">
+      <p:sp>
+        <p:nvSpPr>
+          <p:cNvPr id="3" name="Content Placeholder 2">
             <a:extLst>
               <a:ext uri="{FF2B5EF4-FFF2-40B4-BE49-F238E27FC236}">
-                <a16:creationId xmlns:a16="http://schemas.microsoft.com/office/drawing/2014/main" id="{E9213985-24ED-0449-BBC5-15C918F68199}"/>
+                <a16:creationId xmlns:a16="http://schemas.microsoft.com/office/drawing/2014/main" id="{2AE5FC19-490E-402E-9E9D-95D5EAA90014}"/>
               </a:ext>
             </a:extLst>
           </p:cNvPr>
-          <p:cNvPicPr>
-            <a:picLocks noGrp="1" noChangeAspect="1"/>
-          </p:cNvPicPr>
+          <p:cNvSpPr>
+            <a:spLocks noGrp="1"/>
+          </p:cNvSpPr>
           <p:nvPr>
             <p:ph idx="1"/>
           </p:nvPr>
-        </p:nvPicPr>
-        <p:blipFill>
-          <a:blip r:embed="rId2"/>
-          <a:stretch>
-            <a:fillRect/>
-          </a:stretch>
-        </p:blipFill>
-        <p:spPr>
-          <a:xfrm>
-            <a:off x="1023938" y="2780968"/>
-            <a:ext cx="9720262" cy="3032789"/>
-          </a:xfrm>
-        </p:spPr>
-      </p:pic>
+        </p:nvSpPr>
+        <p:spPr/>
+        <p:txBody>
+          <a:bodyPr/>
+          <a:lstStyle/>
+          <a:p>
+            <a:r>
+              <a:rPr lang="en-AU" dirty="0"/>
+              <a:t>AV drives between a line of parked cars, pedestrians suddenly cross its path ahead</a:t>
+            </a:r>
+          </a:p>
+          <a:p>
+            <a:r>
+              <a:rPr lang="en-AU" dirty="0"/>
+              <a:t>Scenario parameters:</a:t>
+            </a:r>
+          </a:p>
+          <a:p>
+            <a:pPr lvl="1"/>
+            <a:r>
+              <a:rPr lang="en-AU" dirty="0"/>
+              <a:t>General weather and time of day</a:t>
+            </a:r>
+          </a:p>
+          <a:p>
+            <a:pPr lvl="1"/>
+            <a:r>
+              <a:rPr lang="en-AU" dirty="0"/>
+              <a:t>Pedestrian speed</a:t>
+            </a:r>
+          </a:p>
+          <a:p>
+            <a:pPr lvl="1"/>
+            <a:r>
+              <a:rPr lang="en-AU" dirty="0"/>
+              <a:t>Pedestrian trigger distance</a:t>
+            </a:r>
+          </a:p>
+          <a:p>
+            <a:pPr lvl="1"/>
+            <a:r>
+              <a:rPr lang="en-AU" dirty="0"/>
+              <a:t>Number of parked cars</a:t>
+            </a:r>
+          </a:p>
+          <a:p>
+            <a:pPr lvl="1"/>
+            <a:r>
+              <a:rPr lang="en-AU" dirty="0"/>
+              <a:t>Pedestrian idle time</a:t>
+            </a:r>
+          </a:p>
+          <a:p>
+            <a:pPr lvl="1"/>
+            <a:r>
+              <a:rPr lang="en-AU" dirty="0"/>
+              <a:t>Pedestrian location among parked cars</a:t>
+            </a:r>
+          </a:p>
+          <a:p>
+            <a:pPr lvl="1"/>
+            <a:endParaRPr lang="en-AU" dirty="0"/>
+          </a:p>
+          <a:p>
+            <a:pPr marL="128016" lvl="1" indent="0">
+              <a:buNone/>
+            </a:pPr>
+            <a:r>
+              <a:rPr lang="en-AU" dirty="0"/>
+              <a:t>Issues found:</a:t>
+            </a:r>
+          </a:p>
+          <a:p>
+            <a:pPr lvl="1"/>
+            <a:r>
+              <a:rPr lang="en-AU" dirty="0"/>
+              <a:t>AV fails to stop in time in some circumstances and occasionally doesn’t approach slow enough</a:t>
+            </a:r>
+          </a:p>
+        </p:txBody>
+      </p:sp>
     </p:spTree>
     <p:extLst>
       <p:ext uri="{BB962C8B-B14F-4D97-AF65-F5344CB8AC3E}">
-        <p14:creationId xmlns:p14="http://schemas.microsoft.com/office/powerpoint/2010/main" val="1299020132"/>
+        <p14:creationId xmlns:p14="http://schemas.microsoft.com/office/powerpoint/2010/main" val="916683334"/>
       </p:ext>
     </p:extLst>
   </p:cSld>

</xml_diff>